<commit_message>
added light before and after pics
</commit_message>
<xml_diff>
--- a/poster.pptx
+++ b/poster.pptx
@@ -197,7 +197,7 @@
           <a:p>
             <a:fld id="{0DEDE336-5B65-4C33-851F-FD6343DCB477}" type="datetimeFigureOut">
               <a:rPr lang="en-US" smtClean="0"/>
-              <a:t>5/28/2023</a:t>
+              <a:t>6/22/2023</a:t>
             </a:fld>
             <a:endParaRPr lang="en-US"/>
           </a:p>
@@ -3649,7 +3649,7 @@
                 <a:latin typeface="Arial"/>
                 <a:ea typeface="Noto Sans"/>
               </a:rPr>
-              <a:t>Before vs After</a:t>
+              <a:t>Before vs After Comparison</a:t>
             </a:r>
           </a:p>
         </p:txBody>
@@ -3677,136 +3677,6 @@
             <a:avLst/>
           </a:prstGeom>
           <a:ln w="31750"/>
-        </p:spPr>
-        <p:style>
-          <a:lnRef idx="1">
-            <a:schemeClr val="dk1"/>
-          </a:lnRef>
-          <a:fillRef idx="0">
-            <a:schemeClr val="dk1"/>
-          </a:fillRef>
-          <a:effectRef idx="0">
-            <a:schemeClr val="dk1"/>
-          </a:effectRef>
-          <a:fontRef idx="minor">
-            <a:schemeClr val="tx1"/>
-          </a:fontRef>
-        </p:style>
-      </p:cxnSp>
-      <p:pic>
-        <p:nvPicPr>
-          <p:cNvPr id="26" name="Picture 25" descr="A screenshot of a video game">
-            <a:extLst>
-              <a:ext uri="{FF2B5EF4-FFF2-40B4-BE49-F238E27FC236}">
-                <a16:creationId xmlns:a16="http://schemas.microsoft.com/office/drawing/2014/main" id="{E5C65465-6B6B-E05D-6054-2BD7C110A2DE}"/>
-              </a:ext>
-              <a:ext uri="{C183D7F6-B498-43B3-948B-1728B52AA6E4}">
-                <adec:decorative xmlns:adec="http://schemas.microsoft.com/office/drawing/2017/decorative" val="0"/>
-              </a:ext>
-            </a:extLst>
-          </p:cNvPr>
-          <p:cNvPicPr>
-            <a:picLocks noChangeAspect="1"/>
-          </p:cNvPicPr>
-          <p:nvPr/>
-        </p:nvPicPr>
-        <p:blipFill>
-          <a:blip r:embed="rId3">
-            <a:extLst>
-              <a:ext uri="{28A0092B-C50C-407E-A947-70E740481C1C}">
-                <a14:useLocalDpi xmlns:a14="http://schemas.microsoft.com/office/drawing/2010/main" val="0"/>
-              </a:ext>
-            </a:extLst>
-          </a:blip>
-          <a:stretch>
-            <a:fillRect/>
-          </a:stretch>
-        </p:blipFill>
-        <p:spPr>
-          <a:xfrm>
-            <a:off x="18031453" y="15088317"/>
-            <a:ext cx="8940533" cy="8940533"/>
-          </a:xfrm>
-          <a:prstGeom prst="rect">
-            <a:avLst/>
-          </a:prstGeom>
-          <a:effectLst>
-            <a:outerShdw blurRad="190500" dist="190500" dir="2700000" algn="tl" rotWithShape="0">
-              <a:prstClr val="black">
-                <a:alpha val="42000"/>
-              </a:prstClr>
-            </a:outerShdw>
-          </a:effectLst>
-        </p:spPr>
-      </p:pic>
-      <p:pic>
-        <p:nvPicPr>
-          <p:cNvPr id="28" name="Picture 27" descr="A picture containing screenshot, design, diagram, art&#10;&#10;Description automatically generated">
-            <a:extLst>
-              <a:ext uri="{FF2B5EF4-FFF2-40B4-BE49-F238E27FC236}">
-                <a16:creationId xmlns:a16="http://schemas.microsoft.com/office/drawing/2014/main" id="{1993F9B0-A362-9CEF-921B-66D474651098}"/>
-              </a:ext>
-            </a:extLst>
-          </p:cNvPr>
-          <p:cNvPicPr>
-            <a:picLocks noChangeAspect="1"/>
-          </p:cNvPicPr>
-          <p:nvPr/>
-        </p:nvPicPr>
-        <p:blipFill>
-          <a:blip r:embed="rId4">
-            <a:extLst>
-              <a:ext uri="{28A0092B-C50C-407E-A947-70E740481C1C}">
-                <a14:useLocalDpi xmlns:a14="http://schemas.microsoft.com/office/drawing/2010/main" val="0"/>
-              </a:ext>
-            </a:extLst>
-          </a:blip>
-          <a:stretch>
-            <a:fillRect/>
-          </a:stretch>
-        </p:blipFill>
-        <p:spPr>
-          <a:xfrm>
-            <a:off x="18031452" y="26419367"/>
-            <a:ext cx="8940529" cy="8940529"/>
-          </a:xfrm>
-          <a:prstGeom prst="rect">
-            <a:avLst/>
-          </a:prstGeom>
-          <a:effectLst>
-            <a:outerShdw blurRad="190500" dist="190500" dir="2700000" algn="tl" rotWithShape="0">
-              <a:prstClr val="black">
-                <a:alpha val="42000"/>
-              </a:prstClr>
-            </a:outerShdw>
-          </a:effectLst>
-        </p:spPr>
-      </p:pic>
-      <p:cxnSp>
-        <p:nvCxnSpPr>
-          <p:cNvPr id="30" name="Straight Arrow Connector 29">
-            <a:extLst>
-              <a:ext uri="{FF2B5EF4-FFF2-40B4-BE49-F238E27FC236}">
-                <a16:creationId xmlns:a16="http://schemas.microsoft.com/office/drawing/2014/main" id="{E4CD92C3-16A6-0D4D-A622-25016CBF2F56}"/>
-              </a:ext>
-            </a:extLst>
-          </p:cNvPr>
-          <p:cNvCxnSpPr>
-            <a:cxnSpLocks/>
-          </p:cNvCxnSpPr>
-          <p:nvPr/>
-        </p:nvCxnSpPr>
-        <p:spPr>
-          <a:xfrm>
-            <a:off x="22501716" y="24668440"/>
-            <a:ext cx="0" cy="1245141"/>
-          </a:xfrm>
-          <a:prstGeom prst="straightConnector1">
-            <a:avLst/>
-          </a:prstGeom>
-          <a:ln w="161925">
-            <a:tailEnd type="triangle"/>
-          </a:ln>
         </p:spPr>
         <p:style>
           <a:lnRef idx="1">
@@ -4044,7 +3914,7 @@
           <p:nvPr/>
         </p:nvPicPr>
         <p:blipFill>
-          <a:blip r:embed="rId5" cstate="print">
+          <a:blip r:embed="rId3" cstate="print">
             <a:extLst>
               <a:ext uri="{28A0092B-C50C-407E-A947-70E740481C1C}">
                 <a14:useLocalDpi xmlns:a14="http://schemas.microsoft.com/office/drawing/2010/main" val="0"/>
@@ -4080,7 +3950,7 @@
           <p:nvPr/>
         </p:nvPicPr>
         <p:blipFill>
-          <a:blip r:embed="rId6">
+          <a:blip r:embed="rId4">
             <a:extLst>
               <a:ext uri="{28A0092B-C50C-407E-A947-70E740481C1C}">
                 <a14:useLocalDpi xmlns:a14="http://schemas.microsoft.com/office/drawing/2010/main" val="0"/>
@@ -4127,7 +3997,7 @@
           <p:nvPr/>
         </p:nvPicPr>
         <p:blipFill>
-          <a:blip r:embed="rId7">
+          <a:blip r:embed="rId5">
             <a:extLst>
               <a:ext uri="{28A0092B-C50C-407E-A947-70E740481C1C}">
                 <a14:useLocalDpi xmlns:a14="http://schemas.microsoft.com/office/drawing/2010/main" val="0"/>
@@ -5203,8 +5073,8 @@
           </mc:Fallback>
         </mc:AlternateContent>
       </p:grpSp>
-      <mc:AlternateContent xmlns:mc="http://schemas.openxmlformats.org/markup-compatibility/2006">
-        <mc:Choice xmlns:a14="http://schemas.microsoft.com/office/drawing/2010/main" Requires="a14">
+      <mc:AlternateContent xmlns:mc="http://schemas.openxmlformats.org/markup-compatibility/2006" xmlns:a14="http://schemas.microsoft.com/office/drawing/2010/main">
+        <mc:Choice Requires="a14">
           <p:sp>
             <p:nvSpPr>
               <p:cNvPr id="88" name="TextBox 87">
@@ -5247,29 +5117,39 @@
                 <a14:m>
                   <m:oMath xmlns:m="http://schemas.openxmlformats.org/officeDocument/2006/math">
                     <m:r>
-                      <a:rPr lang="en-US" dirty="0"/>
+                      <a:rPr lang="en-US" dirty="0">
+                        <a:latin typeface="Cambria Math" panose="02040503050406030204" pitchFamily="18" charset="0"/>
+                      </a:rPr>
                       <m:t>𝜌</m:t>
                     </m:r>
                     <m:r>
-                      <a:rPr lang="en-US" dirty="0"/>
+                      <a:rPr lang="en-US" dirty="0">
+                        <a:latin typeface="Cambria Math" panose="02040503050406030204" pitchFamily="18" charset="0"/>
+                      </a:rPr>
                       <m:t>(</m:t>
                     </m:r>
                     <m:acc>
                       <m:accPr>
                         <m:chr m:val="⃗"/>
                         <m:ctrlPr>
-                          <a:rPr lang="en-US" dirty="0"/>
+                          <a:rPr lang="en-US" i="1" dirty="0">
+                            <a:latin typeface="Cambria Math" panose="02040503050406030204" pitchFamily="18" charset="0"/>
+                          </a:rPr>
                         </m:ctrlPr>
                       </m:accPr>
                       <m:e>
                         <m:r>
-                          <a:rPr lang="en-US" dirty="0"/>
+                          <a:rPr lang="en-US" dirty="0">
+                            <a:latin typeface="Cambria Math" panose="02040503050406030204" pitchFamily="18" charset="0"/>
+                          </a:rPr>
                           <m:t>𝑟</m:t>
                         </m:r>
                       </m:e>
                     </m:acc>
                     <m:r>
-                      <a:rPr lang="en-US" dirty="0"/>
+                      <a:rPr lang="en-US" dirty="0">
+                        <a:latin typeface="Cambria Math" panose="02040503050406030204" pitchFamily="18" charset="0"/>
+                      </a:rPr>
                       <m:t>)</m:t>
                     </m:r>
                   </m:oMath>
@@ -5281,7 +5161,9 @@
                 <a14:m>
                   <m:oMath xmlns:m="http://schemas.openxmlformats.org/officeDocument/2006/math">
                     <m:r>
-                      <a:rPr lang="en-US"/>
+                      <a:rPr lang="en-US">
+                        <a:latin typeface="Cambria Math" panose="02040503050406030204" pitchFamily="18" charset="0"/>
+                      </a:rPr>
                       <m:t>𝑄</m:t>
                     </m:r>
                   </m:oMath>
@@ -5296,12 +5178,16 @@
                       <m:accPr>
                         <m:chr m:val="⃗"/>
                         <m:ctrlPr>
-                          <a:rPr lang="en-US"/>
+                          <a:rPr lang="en-US" i="1">
+                            <a:latin typeface="Cambria Math" panose="02040503050406030204" pitchFamily="18" charset="0"/>
+                          </a:rPr>
                         </m:ctrlPr>
                       </m:accPr>
                       <m:e>
                         <m:r>
-                          <a:rPr lang="en-US"/>
+                          <a:rPr lang="en-US">
+                            <a:latin typeface="Cambria Math" panose="02040503050406030204" pitchFamily="18" charset="0"/>
+                          </a:rPr>
                           <m:t>𝑟</m:t>
                         </m:r>
                       </m:e>
@@ -5315,7 +5201,9 @@
                 <a14:m>
                   <m:oMath xmlns:m="http://schemas.openxmlformats.org/officeDocument/2006/math">
                     <m:r>
-                      <a:rPr lang="en-US"/>
+                      <a:rPr lang="en-US">
+                        <a:latin typeface="Cambria Math" panose="02040503050406030204" pitchFamily="18" charset="0"/>
+                      </a:rPr>
                       <m:t>𝐴</m:t>
                     </m:r>
                   </m:oMath>
@@ -5330,16 +5218,22 @@
                       <m:accPr>
                         <m:chr m:val="⃗"/>
                         <m:ctrlPr>
-                          <a:rPr lang="en-US"/>
+                          <a:rPr lang="en-US" i="1">
+                            <a:latin typeface="Cambria Math" panose="02040503050406030204" pitchFamily="18" charset="0"/>
+                          </a:rPr>
                         </m:ctrlPr>
                       </m:accPr>
                       <m:e>
                         <m:r>
-                          <a:rPr lang="en-US"/>
+                          <a:rPr lang="en-US">
+                            <a:latin typeface="Cambria Math" panose="02040503050406030204" pitchFamily="18" charset="0"/>
+                          </a:rPr>
                           <m:t>𝑟</m:t>
                         </m:r>
                         <m:r>
-                          <a:rPr lang="en-US"/>
+                          <a:rPr lang="en-US">
+                            <a:latin typeface="Cambria Math" panose="02040503050406030204" pitchFamily="18" charset="0"/>
+                          </a:rPr>
                           <m:t> </m:t>
                         </m:r>
                       </m:e>
@@ -5355,41 +5249,55 @@
                     <m:sSup>
                       <m:sSupPr>
                         <m:ctrlPr>
-                          <a:rPr lang="en-US"/>
+                          <a:rPr lang="en-US" i="1">
+                            <a:latin typeface="Cambria Math" panose="02040503050406030204" pitchFamily="18" charset="0"/>
+                          </a:rPr>
                         </m:ctrlPr>
                       </m:sSupPr>
                       <m:e>
                         <m:r>
-                          <a:rPr lang="en-US"/>
+                          <a:rPr lang="en-US">
+                            <a:latin typeface="Cambria Math" panose="02040503050406030204" pitchFamily="18" charset="0"/>
+                          </a:rPr>
                           <m:t>𝑥</m:t>
                         </m:r>
                       </m:e>
                       <m:sup>
                         <m:r>
-                          <a:rPr lang="en-US"/>
+                          <a:rPr lang="en-US">
+                            <a:latin typeface="Cambria Math" panose="02040503050406030204" pitchFamily="18" charset="0"/>
+                          </a:rPr>
                           <m:t>2</m:t>
                         </m:r>
                       </m:sup>
                     </m:sSup>
                     <m:r>
-                      <a:rPr lang="en-US"/>
+                      <a:rPr lang="en-US">
+                        <a:latin typeface="Cambria Math" panose="02040503050406030204" pitchFamily="18" charset="0"/>
+                      </a:rPr>
                       <m:t>+</m:t>
                     </m:r>
                     <m:sSup>
                       <m:sSupPr>
                         <m:ctrlPr>
-                          <a:rPr lang="en-US"/>
+                          <a:rPr lang="en-US" i="1">
+                            <a:latin typeface="Cambria Math" panose="02040503050406030204" pitchFamily="18" charset="0"/>
+                          </a:rPr>
                         </m:ctrlPr>
                       </m:sSupPr>
                       <m:e>
                         <m:r>
-                          <a:rPr lang="en-US"/>
+                          <a:rPr lang="en-US">
+                            <a:latin typeface="Cambria Math" panose="02040503050406030204" pitchFamily="18" charset="0"/>
+                          </a:rPr>
                           <m:t>𝑦</m:t>
                         </m:r>
                       </m:e>
                       <m:sup>
                         <m:r>
-                          <a:rPr lang="en-US"/>
+                          <a:rPr lang="en-US">
+                            <a:latin typeface="Cambria Math" panose="02040503050406030204" pitchFamily="18" charset="0"/>
+                          </a:rPr>
                           <m:t>2</m:t>
                         </m:r>
                       </m:sup>
@@ -5404,7 +5312,7 @@
             </p:txBody>
           </p:sp>
         </mc:Choice>
-        <mc:Fallback>
+        <mc:Fallback xmlns="">
           <p:sp>
             <p:nvSpPr>
               <p:cNvPr id="88" name="TextBox 87">
@@ -5552,41 +5460,6 @@
           </a:fontRef>
         </p:style>
       </p:cxnSp>
-      <p:sp>
-        <p:nvSpPr>
-          <p:cNvPr id="99" name="TextBox 98">
-            <a:extLst>
-              <a:ext uri="{FF2B5EF4-FFF2-40B4-BE49-F238E27FC236}">
-                <a16:creationId xmlns:a16="http://schemas.microsoft.com/office/drawing/2014/main" id="{C52E0384-CF04-45A8-3ABD-16F82B8E4699}"/>
-              </a:ext>
-            </a:extLst>
-          </p:cNvPr>
-          <p:cNvSpPr txBox="1"/>
-          <p:nvPr/>
-        </p:nvSpPr>
-        <p:spPr>
-          <a:xfrm>
-            <a:off x="1366787" y="28023482"/>
-            <a:ext cx="13263613" cy="707886"/>
-          </a:xfrm>
-          <a:prstGeom prst="rect">
-            <a:avLst/>
-          </a:prstGeom>
-          <a:noFill/>
-        </p:spPr>
-        <p:txBody>
-          <a:bodyPr wrap="square">
-            <a:spAutoFit/>
-          </a:bodyPr>
-          <a:lstStyle/>
-          <a:p>
-            <a:r>
-              <a:rPr lang="en-US" sz="4000" b="1" dirty="0"/>
-              <a:t>Most common case: vertex on edge </a:t>
-            </a:r>
-          </a:p>
-        </p:txBody>
-      </p:sp>
       <p:grpSp>
         <p:nvGrpSpPr>
           <p:cNvPr id="1074" name="Group 1073">
@@ -6319,45 +6192,101 @@
           </a:p>
         </p:txBody>
       </p:sp>
-      <p:cxnSp>
-        <p:nvCxnSpPr>
-          <p:cNvPr id="125" name="Straight Connector 124">
+      <p:grpSp>
+        <p:nvGrpSpPr>
+          <p:cNvPr id="15" name="Group 14">
             <a:extLst>
               <a:ext uri="{FF2B5EF4-FFF2-40B4-BE49-F238E27FC236}">
-                <a16:creationId xmlns:a16="http://schemas.microsoft.com/office/drawing/2014/main" id="{BE7A8EC9-D33E-2BBA-B1AD-3EA5C7BFCBA9}"/>
+                <a16:creationId xmlns:a16="http://schemas.microsoft.com/office/drawing/2014/main" id="{5FBC8AB9-5520-90FF-1A19-1CA21EE8F196}"/>
               </a:ext>
             </a:extLst>
           </p:cNvPr>
-          <p:cNvCxnSpPr>
-            <a:cxnSpLocks/>
-          </p:cNvCxnSpPr>
+          <p:cNvGrpSpPr/>
           <p:nvPr/>
-        </p:nvCxnSpPr>
-        <p:spPr>
-          <a:xfrm>
-            <a:off x="1368000" y="28795575"/>
-            <a:ext cx="13263613" cy="0"/>
-          </a:xfrm>
-          <a:prstGeom prst="line">
-            <a:avLst/>
-          </a:prstGeom>
-          <a:ln w="6350"/>
-        </p:spPr>
-        <p:style>
-          <a:lnRef idx="1">
-            <a:schemeClr val="dk1"/>
-          </a:lnRef>
-          <a:fillRef idx="0">
-            <a:schemeClr val="dk1"/>
-          </a:fillRef>
-          <a:effectRef idx="0">
-            <a:schemeClr val="dk1"/>
-          </a:effectRef>
-          <a:fontRef idx="minor">
-            <a:schemeClr val="tx1"/>
-          </a:fontRef>
-        </p:style>
-      </p:cxnSp>
+        </p:nvGrpSpPr>
+        <p:grpSpPr>
+          <a:xfrm>
+            <a:off x="1366787" y="28023482"/>
+            <a:ext cx="13264826" cy="772093"/>
+            <a:chOff x="1366787" y="28023482"/>
+            <a:chExt cx="13264826" cy="772093"/>
+          </a:xfrm>
+        </p:grpSpPr>
+        <p:sp>
+          <p:nvSpPr>
+            <p:cNvPr id="99" name="TextBox 98">
+              <a:extLst>
+                <a:ext uri="{FF2B5EF4-FFF2-40B4-BE49-F238E27FC236}">
+                  <a16:creationId xmlns:a16="http://schemas.microsoft.com/office/drawing/2014/main" id="{C52E0384-CF04-45A8-3ABD-16F82B8E4699}"/>
+                </a:ext>
+              </a:extLst>
+            </p:cNvPr>
+            <p:cNvSpPr txBox="1"/>
+            <p:nvPr/>
+          </p:nvSpPr>
+          <p:spPr>
+            <a:xfrm>
+              <a:off x="1366787" y="28023482"/>
+              <a:ext cx="13263613" cy="707886"/>
+            </a:xfrm>
+            <a:prstGeom prst="rect">
+              <a:avLst/>
+            </a:prstGeom>
+            <a:noFill/>
+          </p:spPr>
+          <p:txBody>
+            <a:bodyPr wrap="square">
+              <a:spAutoFit/>
+            </a:bodyPr>
+            <a:lstStyle/>
+            <a:p>
+              <a:r>
+                <a:rPr lang="en-US" sz="4000" b="1" dirty="0"/>
+                <a:t>Most common case: vertex on edge </a:t>
+              </a:r>
+            </a:p>
+          </p:txBody>
+        </p:sp>
+        <p:cxnSp>
+          <p:nvCxnSpPr>
+            <p:cNvPr id="125" name="Straight Connector 124">
+              <a:extLst>
+                <a:ext uri="{FF2B5EF4-FFF2-40B4-BE49-F238E27FC236}">
+                  <a16:creationId xmlns:a16="http://schemas.microsoft.com/office/drawing/2014/main" id="{BE7A8EC9-D33E-2BBA-B1AD-3EA5C7BFCBA9}"/>
+                </a:ext>
+              </a:extLst>
+            </p:cNvPr>
+            <p:cNvCxnSpPr>
+              <a:cxnSpLocks/>
+            </p:cNvCxnSpPr>
+            <p:nvPr/>
+          </p:nvCxnSpPr>
+          <p:spPr>
+            <a:xfrm>
+              <a:off x="1368000" y="28795575"/>
+              <a:ext cx="13263613" cy="0"/>
+            </a:xfrm>
+            <a:prstGeom prst="line">
+              <a:avLst/>
+            </a:prstGeom>
+            <a:ln w="6350"/>
+          </p:spPr>
+          <p:style>
+            <a:lnRef idx="1">
+              <a:schemeClr val="dk1"/>
+            </a:lnRef>
+            <a:fillRef idx="0">
+              <a:schemeClr val="dk1"/>
+            </a:fillRef>
+            <a:effectRef idx="0">
+              <a:schemeClr val="dk1"/>
+            </a:effectRef>
+            <a:fontRef idx="minor">
+              <a:schemeClr val="tx1"/>
+            </a:fontRef>
+          </p:style>
+        </p:cxnSp>
+      </p:grpSp>
       <p:cxnSp>
         <p:nvCxnSpPr>
           <p:cNvPr id="126" name="Straight Connector 125">
@@ -7685,6 +7614,328 @@
           </p:style>
         </p:cxnSp>
       </p:grpSp>
+      <p:pic>
+        <p:nvPicPr>
+          <p:cNvPr id="7" name="Picture 6" descr="A picture containing screenshot, colorfulness">
+            <a:extLst>
+              <a:ext uri="{FF2B5EF4-FFF2-40B4-BE49-F238E27FC236}">
+                <a16:creationId xmlns:a16="http://schemas.microsoft.com/office/drawing/2014/main" id="{9D647AB0-D030-FDD2-5AE0-21F8A3D6C27E}"/>
+              </a:ext>
+            </a:extLst>
+          </p:cNvPr>
+          <p:cNvPicPr>
+            <a:picLocks noChangeAspect="1"/>
+          </p:cNvPicPr>
+          <p:nvPr/>
+        </p:nvPicPr>
+        <p:blipFill>
+          <a:blip r:embed="rId11">
+            <a:extLst>
+              <a:ext uri="{28A0092B-C50C-407E-A947-70E740481C1C}">
+                <a14:useLocalDpi xmlns:a14="http://schemas.microsoft.com/office/drawing/2010/main" val="0"/>
+              </a:ext>
+            </a:extLst>
+          </a:blip>
+          <a:stretch>
+            <a:fillRect/>
+          </a:stretch>
+        </p:blipFill>
+        <p:spPr>
+          <a:xfrm>
+            <a:off x="18609493" y="16107002"/>
+            <a:ext cx="7620000" cy="7620000"/>
+          </a:xfrm>
+          <a:prstGeom prst="rect">
+            <a:avLst/>
+          </a:prstGeom>
+          <a:solidFill>
+            <a:srgbClr val="FFFFFF">
+              <a:shade val="85000"/>
+            </a:srgbClr>
+          </a:solidFill>
+          <a:ln w="88900" cap="sq">
+            <a:solidFill>
+              <a:srgbClr val="FFFFFF"/>
+            </a:solidFill>
+            <a:miter lim="800000"/>
+          </a:ln>
+          <a:effectLst>
+            <a:outerShdw blurRad="55000" dist="18000" dir="5400000" algn="tl" rotWithShape="0">
+              <a:srgbClr val="000000">
+                <a:alpha val="40000"/>
+              </a:srgbClr>
+            </a:outerShdw>
+          </a:effectLst>
+          <a:scene3d>
+            <a:camera prst="orthographicFront"/>
+            <a:lightRig rig="twoPt" dir="t">
+              <a:rot lat="0" lon="0" rev="7200000"/>
+            </a:lightRig>
+          </a:scene3d>
+          <a:sp3d>
+            <a:bevelT w="25400" h="19050"/>
+            <a:contourClr>
+              <a:srgbClr val="FFFFFF"/>
+            </a:contourClr>
+          </a:sp3d>
+        </p:spPr>
+      </p:pic>
+      <p:pic>
+        <p:nvPicPr>
+          <p:cNvPr id="11" name="Picture 10" descr="A picture containing construction paper, paper product, origami&#10;&#10;Description automatically generated">
+            <a:extLst>
+              <a:ext uri="{FF2B5EF4-FFF2-40B4-BE49-F238E27FC236}">
+                <a16:creationId xmlns:a16="http://schemas.microsoft.com/office/drawing/2014/main" id="{EC75E693-EF13-DC2B-316D-DA61E70135D1}"/>
+              </a:ext>
+            </a:extLst>
+          </p:cNvPr>
+          <p:cNvPicPr>
+            <a:picLocks noChangeAspect="1"/>
+          </p:cNvPicPr>
+          <p:nvPr/>
+        </p:nvPicPr>
+        <p:blipFill>
+          <a:blip r:embed="rId12">
+            <a:extLst>
+              <a:ext uri="{28A0092B-C50C-407E-A947-70E740481C1C}">
+                <a14:useLocalDpi xmlns:a14="http://schemas.microsoft.com/office/drawing/2010/main" val="0"/>
+              </a:ext>
+            </a:extLst>
+          </a:blip>
+          <a:stretch>
+            <a:fillRect/>
+          </a:stretch>
+        </p:blipFill>
+        <p:spPr>
+          <a:xfrm>
+            <a:off x="18609493" y="26082705"/>
+            <a:ext cx="7620000" cy="7620000"/>
+          </a:xfrm>
+          <a:prstGeom prst="rect">
+            <a:avLst/>
+          </a:prstGeom>
+          <a:solidFill>
+            <a:srgbClr val="FFFFFF">
+              <a:shade val="85000"/>
+            </a:srgbClr>
+          </a:solidFill>
+          <a:ln w="88900" cap="sq">
+            <a:solidFill>
+              <a:srgbClr val="FFFFFF"/>
+            </a:solidFill>
+            <a:miter lim="800000"/>
+          </a:ln>
+          <a:effectLst>
+            <a:outerShdw blurRad="55000" dist="18000" dir="5400000" algn="tl" rotWithShape="0">
+              <a:srgbClr val="000000">
+                <a:alpha val="40000"/>
+              </a:srgbClr>
+            </a:outerShdw>
+          </a:effectLst>
+          <a:scene3d>
+            <a:camera prst="orthographicFront"/>
+            <a:lightRig rig="twoPt" dir="t">
+              <a:rot lat="0" lon="0" rev="7200000"/>
+            </a:lightRig>
+          </a:scene3d>
+          <a:sp3d>
+            <a:bevelT w="25400" h="19050"/>
+            <a:contourClr>
+              <a:srgbClr val="FFFFFF"/>
+            </a:contourClr>
+          </a:sp3d>
+        </p:spPr>
+      </p:pic>
+      <p:grpSp>
+        <p:nvGrpSpPr>
+          <p:cNvPr id="22" name="Group 21">
+            <a:extLst>
+              <a:ext uri="{FF2B5EF4-FFF2-40B4-BE49-F238E27FC236}">
+                <a16:creationId xmlns:a16="http://schemas.microsoft.com/office/drawing/2014/main" id="{F307927B-0219-5A4F-1AE3-24FD562F3E6A}"/>
+              </a:ext>
+            </a:extLst>
+          </p:cNvPr>
+          <p:cNvGrpSpPr/>
+          <p:nvPr/>
+        </p:nvGrpSpPr>
+        <p:grpSpPr>
+          <a:xfrm>
+            <a:off x="15622200" y="14943116"/>
+            <a:ext cx="13264826" cy="772093"/>
+            <a:chOff x="15622200" y="14875741"/>
+            <a:chExt cx="13264826" cy="772093"/>
+          </a:xfrm>
+        </p:grpSpPr>
+        <p:sp>
+          <p:nvSpPr>
+            <p:cNvPr id="12" name="TextBox 11">
+              <a:extLst>
+                <a:ext uri="{FF2B5EF4-FFF2-40B4-BE49-F238E27FC236}">
+                  <a16:creationId xmlns:a16="http://schemas.microsoft.com/office/drawing/2014/main" id="{C0298146-66F1-8DD2-7ABE-CC24F7634270}"/>
+                </a:ext>
+              </a:extLst>
+            </p:cNvPr>
+            <p:cNvSpPr txBox="1"/>
+            <p:nvPr/>
+          </p:nvSpPr>
+          <p:spPr>
+            <a:xfrm>
+              <a:off x="15622200" y="14875741"/>
+              <a:ext cx="13263613" cy="707886"/>
+            </a:xfrm>
+            <a:prstGeom prst="rect">
+              <a:avLst/>
+            </a:prstGeom>
+            <a:noFill/>
+          </p:spPr>
+          <p:txBody>
+            <a:bodyPr wrap="square">
+              <a:spAutoFit/>
+            </a:bodyPr>
+            <a:lstStyle/>
+            <a:p>
+              <a:r>
+                <a:rPr lang="en-US" sz="4000" b="1" dirty="0"/>
+                <a:t>Flying balls</a:t>
+              </a:r>
+            </a:p>
+          </p:txBody>
+        </p:sp>
+        <p:cxnSp>
+          <p:nvCxnSpPr>
+            <p:cNvPr id="13" name="Straight Connector 12">
+              <a:extLst>
+                <a:ext uri="{FF2B5EF4-FFF2-40B4-BE49-F238E27FC236}">
+                  <a16:creationId xmlns:a16="http://schemas.microsoft.com/office/drawing/2014/main" id="{9E913D24-857A-6D69-B0DF-F6E135D38556}"/>
+                </a:ext>
+              </a:extLst>
+            </p:cNvPr>
+            <p:cNvCxnSpPr>
+              <a:cxnSpLocks/>
+            </p:cNvCxnSpPr>
+            <p:nvPr/>
+          </p:nvCxnSpPr>
+          <p:spPr>
+            <a:xfrm>
+              <a:off x="15623413" y="15647834"/>
+              <a:ext cx="13263613" cy="0"/>
+            </a:xfrm>
+            <a:prstGeom prst="line">
+              <a:avLst/>
+            </a:prstGeom>
+            <a:ln w="6350"/>
+          </p:spPr>
+          <p:style>
+            <a:lnRef idx="1">
+              <a:schemeClr val="dk1"/>
+            </a:lnRef>
+            <a:fillRef idx="0">
+              <a:schemeClr val="dk1"/>
+            </a:fillRef>
+            <a:effectRef idx="0">
+              <a:schemeClr val="dk1"/>
+            </a:effectRef>
+            <a:fontRef idx="minor">
+              <a:schemeClr val="tx1"/>
+            </a:fontRef>
+          </p:style>
+        </p:cxnSp>
+      </p:grpSp>
+      <p:grpSp>
+        <p:nvGrpSpPr>
+          <p:cNvPr id="16" name="Group 15">
+            <a:extLst>
+              <a:ext uri="{FF2B5EF4-FFF2-40B4-BE49-F238E27FC236}">
+                <a16:creationId xmlns:a16="http://schemas.microsoft.com/office/drawing/2014/main" id="{40313D85-DB94-8EC7-0E1E-6B13DA49B60F}"/>
+              </a:ext>
+            </a:extLst>
+          </p:cNvPr>
+          <p:cNvGrpSpPr/>
+          <p:nvPr/>
+        </p:nvGrpSpPr>
+        <p:grpSpPr>
+          <a:xfrm>
+            <a:off x="15620987" y="24411091"/>
+            <a:ext cx="13264826" cy="772093"/>
+            <a:chOff x="1366787" y="28023482"/>
+            <a:chExt cx="13264826" cy="772093"/>
+          </a:xfrm>
+        </p:grpSpPr>
+        <p:sp>
+          <p:nvSpPr>
+            <p:cNvPr id="18" name="TextBox 17">
+              <a:extLst>
+                <a:ext uri="{FF2B5EF4-FFF2-40B4-BE49-F238E27FC236}">
+                  <a16:creationId xmlns:a16="http://schemas.microsoft.com/office/drawing/2014/main" id="{316EA711-4259-A7FB-3390-136628031C44}"/>
+                </a:ext>
+              </a:extLst>
+            </p:cNvPr>
+            <p:cNvSpPr txBox="1"/>
+            <p:nvPr/>
+          </p:nvSpPr>
+          <p:spPr>
+            <a:xfrm>
+              <a:off x="1366787" y="28023482"/>
+              <a:ext cx="13263613" cy="707886"/>
+            </a:xfrm>
+            <a:prstGeom prst="rect">
+              <a:avLst/>
+            </a:prstGeom>
+            <a:noFill/>
+          </p:spPr>
+          <p:txBody>
+            <a:bodyPr wrap="square">
+              <a:spAutoFit/>
+            </a:bodyPr>
+            <a:lstStyle/>
+            <a:p>
+              <a:r>
+                <a:rPr lang="en-US" sz="4000" b="1" dirty="0"/>
+                <a:t>Colliding polygons</a:t>
+              </a:r>
+            </a:p>
+          </p:txBody>
+        </p:sp>
+        <p:cxnSp>
+          <p:nvCxnSpPr>
+            <p:cNvPr id="21" name="Straight Connector 20">
+              <a:extLst>
+                <a:ext uri="{FF2B5EF4-FFF2-40B4-BE49-F238E27FC236}">
+                  <a16:creationId xmlns:a16="http://schemas.microsoft.com/office/drawing/2014/main" id="{646200E0-6BEC-9312-1C07-ED725745805F}"/>
+                </a:ext>
+              </a:extLst>
+            </p:cNvPr>
+            <p:cNvCxnSpPr>
+              <a:cxnSpLocks/>
+            </p:cNvCxnSpPr>
+            <p:nvPr/>
+          </p:nvCxnSpPr>
+          <p:spPr>
+            <a:xfrm>
+              <a:off x="1368000" y="28795575"/>
+              <a:ext cx="13263613" cy="0"/>
+            </a:xfrm>
+            <a:prstGeom prst="line">
+              <a:avLst/>
+            </a:prstGeom>
+            <a:ln w="6350"/>
+          </p:spPr>
+          <p:style>
+            <a:lnRef idx="1">
+              <a:schemeClr val="dk1"/>
+            </a:lnRef>
+            <a:fillRef idx="0">
+              <a:schemeClr val="dk1"/>
+            </a:fillRef>
+            <a:effectRef idx="0">
+              <a:schemeClr val="dk1"/>
+            </a:effectRef>
+            <a:fontRef idx="minor">
+              <a:schemeClr val="tx1"/>
+            </a:fontRef>
+          </p:style>
+        </p:cxnSp>
+      </p:grpSp>
     </p:spTree>
   </p:cSld>
   <p:clrMapOvr>

</xml_diff>

<commit_message>
finished collision resolution section
</commit_message>
<xml_diff>
--- a/poster.pptx
+++ b/poster.pptx
@@ -3709,7 +3709,7 @@
         </p:nvSpPr>
         <p:spPr>
           <a:xfrm>
-            <a:off x="15771600" y="36233265"/>
+            <a:off x="15770040" y="34655412"/>
             <a:ext cx="13298906" cy="767160"/>
           </a:xfrm>
           <a:prstGeom prst="rect">
@@ -3773,7 +3773,7 @@
         </p:nvCxnSpPr>
         <p:spPr>
           <a:xfrm>
-            <a:off x="15624000" y="37086652"/>
+            <a:off x="15622440" y="35508799"/>
             <a:ext cx="13100400" cy="0"/>
           </a:xfrm>
           <a:prstGeom prst="line">
@@ -4245,7 +4245,7 @@
         </p:nvSpPr>
         <p:spPr>
           <a:xfrm>
-            <a:off x="15622200" y="37432070"/>
+            <a:off x="15620640" y="35879620"/>
             <a:ext cx="13100400" cy="3108543"/>
           </a:xfrm>
           <a:prstGeom prst="rect">
@@ -6328,56 +6328,6 @@
       </p:cxnSp>
       <p:sp>
         <p:nvSpPr>
-          <p:cNvPr id="127" name="TextBox 126">
-            <a:extLst>
-              <a:ext uri="{FF2B5EF4-FFF2-40B4-BE49-F238E27FC236}">
-                <a16:creationId xmlns:a16="http://schemas.microsoft.com/office/drawing/2014/main" id="{1ABD063D-302A-284F-BF7E-5F4EB3CDAADD}"/>
-              </a:ext>
-            </a:extLst>
-          </p:cNvPr>
-          <p:cNvSpPr txBox="1"/>
-          <p:nvPr/>
-        </p:nvSpPr>
-        <p:spPr>
-          <a:xfrm rot="2160186">
-            <a:off x="17665612" y="9124526"/>
-            <a:ext cx="9871053" cy="1200329"/>
-          </a:xfrm>
-          <a:prstGeom prst="rect">
-            <a:avLst/>
-          </a:prstGeom>
-          <a:noFill/>
-          <a:ln w="63500" cap="flat">
-            <a:solidFill>
-              <a:schemeClr val="bg1">
-                <a:lumMod val="85000"/>
-              </a:schemeClr>
-            </a:solidFill>
-            <a:round/>
-          </a:ln>
-        </p:spPr>
-        <p:txBody>
-          <a:bodyPr wrap="square" rtlCol="0">
-            <a:spAutoFit/>
-          </a:bodyPr>
-          <a:lstStyle/>
-          <a:p>
-            <a:pPr algn="ctr"/>
-            <a:r>
-              <a:rPr lang="en-US" sz="7200" b="1" dirty="0">
-                <a:solidFill>
-                  <a:schemeClr val="bg1">
-                    <a:lumMod val="75000"/>
-                  </a:schemeClr>
-                </a:solidFill>
-              </a:rPr>
-              <a:t>PHYSICS FORMULAS</a:t>
-            </a:r>
-          </a:p>
-        </p:txBody>
-      </p:sp>
-      <p:sp>
-        <p:nvSpPr>
           <p:cNvPr id="1024" name="TextBox 1023">
             <a:extLst>
               <a:ext uri="{FF2B5EF4-FFF2-40B4-BE49-F238E27FC236}">
@@ -7642,7 +7592,7 @@
         </p:blipFill>
         <p:spPr>
           <a:xfrm>
-            <a:off x="18609493" y="16107002"/>
+            <a:off x="18609493" y="16319389"/>
             <a:ext cx="7620000" cy="7620000"/>
           </a:xfrm>
           <a:prstGeom prst="rect">
@@ -7708,7 +7658,7 @@
         </p:blipFill>
         <p:spPr>
           <a:xfrm>
-            <a:off x="18609493" y="26082705"/>
+            <a:off x="18609493" y="26237263"/>
             <a:ext cx="7620000" cy="7620000"/>
           </a:xfrm>
           <a:prstGeom prst="rect">
@@ -7855,7 +7805,7 @@
         </p:nvGrpSpPr>
         <p:grpSpPr>
           <a:xfrm>
-            <a:off x="15620987" y="24411091"/>
+            <a:off x="15620987" y="24702916"/>
             <a:ext cx="13264826" cy="772093"/>
             <a:chOff x="1366787" y="28023482"/>
             <a:chExt cx="13264826" cy="772093"/>
@@ -7936,6 +7886,683 @@
           </p:style>
         </p:cxnSp>
       </p:grpSp>
+      <p:sp>
+        <p:nvSpPr>
+          <p:cNvPr id="24" name="TextBox 23">
+            <a:extLst>
+              <a:ext uri="{FF2B5EF4-FFF2-40B4-BE49-F238E27FC236}">
+                <a16:creationId xmlns:a16="http://schemas.microsoft.com/office/drawing/2014/main" id="{E072FBEB-599D-F0F7-4079-1412A5D5A9C4}"/>
+              </a:ext>
+            </a:extLst>
+          </p:cNvPr>
+          <p:cNvSpPr txBox="1"/>
+          <p:nvPr/>
+        </p:nvSpPr>
+        <p:spPr>
+          <a:xfrm>
+            <a:off x="14681200" y="20945475"/>
+            <a:ext cx="65" cy="276999"/>
+          </a:xfrm>
+          <a:prstGeom prst="rect">
+            <a:avLst/>
+          </a:prstGeom>
+          <a:noFill/>
+        </p:spPr>
+        <p:txBody>
+          <a:bodyPr wrap="none" lIns="0" tIns="0" rIns="0" bIns="0" rtlCol="0">
+            <a:spAutoFit/>
+          </a:bodyPr>
+          <a:lstStyle/>
+          <a:p>
+            <a:endParaRPr lang="en-US" dirty="0"/>
+          </a:p>
+        </p:txBody>
+      </p:sp>
+      <p:sp>
+        <p:nvSpPr>
+          <p:cNvPr id="75" name="TextBox 74">
+            <a:extLst>
+              <a:ext uri="{FF2B5EF4-FFF2-40B4-BE49-F238E27FC236}">
+                <a16:creationId xmlns:a16="http://schemas.microsoft.com/office/drawing/2014/main" id="{63E790C8-B54A-D661-A88B-384DDC767F2F}"/>
+              </a:ext>
+            </a:extLst>
+          </p:cNvPr>
+          <p:cNvSpPr txBox="1"/>
+          <p:nvPr/>
+        </p:nvSpPr>
+        <p:spPr>
+          <a:xfrm>
+            <a:off x="15735470" y="13141217"/>
+            <a:ext cx="7267500" cy="338554"/>
+          </a:xfrm>
+          <a:prstGeom prst="rect">
+            <a:avLst/>
+          </a:prstGeom>
+          <a:noFill/>
+        </p:spPr>
+        <p:txBody>
+          <a:bodyPr wrap="square" rtlCol="0">
+            <a:spAutoFit/>
+          </a:bodyPr>
+          <a:lstStyle/>
+          <a:p>
+            <a:r>
+              <a:rPr lang="en-US" sz="1600" dirty="0"/>
+              <a:t>I could write stuff that doesn’t make sense, you wouldn’t even notice :)</a:t>
+            </a:r>
+          </a:p>
+        </p:txBody>
+      </p:sp>
+      <p:pic>
+        <p:nvPicPr>
+          <p:cNvPr id="80" name="Picture 79">
+            <a:extLst>
+              <a:ext uri="{FF2B5EF4-FFF2-40B4-BE49-F238E27FC236}">
+                <a16:creationId xmlns:a16="http://schemas.microsoft.com/office/drawing/2014/main" id="{CB4BD291-89E7-7EA3-9622-14EA5A6410E5}"/>
+              </a:ext>
+            </a:extLst>
+          </p:cNvPr>
+          <p:cNvPicPr>
+            <a:picLocks noChangeAspect="1"/>
+          </p:cNvPicPr>
+          <p:nvPr/>
+        </p:nvPicPr>
+        <p:blipFill>
+          <a:blip r:embed="rId13"/>
+          <a:stretch>
+            <a:fillRect/>
+          </a:stretch>
+        </p:blipFill>
+        <p:spPr>
+          <a:xfrm rot="1357871">
+            <a:off x="25487869" y="9887149"/>
+            <a:ext cx="2913488" cy="1861395"/>
+          </a:xfrm>
+          <a:prstGeom prst="rect">
+            <a:avLst/>
+          </a:prstGeom>
+          <a:solidFill>
+            <a:srgbClr val="FFFFFF">
+              <a:shade val="85000"/>
+            </a:srgbClr>
+          </a:solidFill>
+          <a:ln w="88900" cap="sq">
+            <a:solidFill>
+              <a:srgbClr val="FFFFFF"/>
+            </a:solidFill>
+            <a:miter lim="800000"/>
+          </a:ln>
+          <a:effectLst>
+            <a:outerShdw blurRad="55000" dist="18000" dir="5400000" algn="tl" rotWithShape="0">
+              <a:srgbClr val="000000">
+                <a:alpha val="40000"/>
+              </a:srgbClr>
+            </a:outerShdw>
+          </a:effectLst>
+          <a:scene3d>
+            <a:camera prst="orthographicFront"/>
+            <a:lightRig rig="twoPt" dir="t">
+              <a:rot lat="0" lon="0" rev="7200000"/>
+            </a:lightRig>
+          </a:scene3d>
+          <a:sp3d>
+            <a:bevelT w="25400" h="19050"/>
+            <a:contourClr>
+              <a:srgbClr val="FFFFFF"/>
+            </a:contourClr>
+          </a:sp3d>
+        </p:spPr>
+      </p:pic>
+      <p:pic>
+        <p:nvPicPr>
+          <p:cNvPr id="90" name="Picture 89">
+            <a:extLst>
+              <a:ext uri="{FF2B5EF4-FFF2-40B4-BE49-F238E27FC236}">
+                <a16:creationId xmlns:a16="http://schemas.microsoft.com/office/drawing/2014/main" id="{496CD7FC-F4A5-D6C5-4135-480E4D275877}"/>
+              </a:ext>
+            </a:extLst>
+          </p:cNvPr>
+          <p:cNvPicPr>
+            <a:picLocks noChangeAspect="1"/>
+          </p:cNvPicPr>
+          <p:nvPr/>
+        </p:nvPicPr>
+        <p:blipFill>
+          <a:blip r:embed="rId14"/>
+          <a:stretch>
+            <a:fillRect/>
+          </a:stretch>
+        </p:blipFill>
+        <p:spPr>
+          <a:xfrm rot="21087766">
+            <a:off x="25284850" y="12332470"/>
+            <a:ext cx="2882684" cy="701000"/>
+          </a:xfrm>
+          <a:prstGeom prst="rect">
+            <a:avLst/>
+          </a:prstGeom>
+          <a:solidFill>
+            <a:srgbClr val="FFFFFF">
+              <a:shade val="85000"/>
+            </a:srgbClr>
+          </a:solidFill>
+          <a:ln w="88900" cap="sq">
+            <a:solidFill>
+              <a:srgbClr val="FFFFFF"/>
+            </a:solidFill>
+            <a:miter lim="800000"/>
+          </a:ln>
+          <a:effectLst>
+            <a:outerShdw blurRad="55000" dist="18000" dir="5400000" algn="tl" rotWithShape="0">
+              <a:srgbClr val="000000">
+                <a:alpha val="40000"/>
+              </a:srgbClr>
+            </a:outerShdw>
+          </a:effectLst>
+          <a:scene3d>
+            <a:camera prst="orthographicFront"/>
+            <a:lightRig rig="twoPt" dir="t">
+              <a:rot lat="0" lon="0" rev="7200000"/>
+            </a:lightRig>
+          </a:scene3d>
+          <a:sp3d>
+            <a:bevelT w="25400" h="19050"/>
+            <a:contourClr>
+              <a:srgbClr val="FFFFFF"/>
+            </a:contourClr>
+          </a:sp3d>
+        </p:spPr>
+      </p:pic>
+      <p:pic>
+        <p:nvPicPr>
+          <p:cNvPr id="92" name="Picture 91">
+            <a:extLst>
+              <a:ext uri="{FF2B5EF4-FFF2-40B4-BE49-F238E27FC236}">
+                <a16:creationId xmlns:a16="http://schemas.microsoft.com/office/drawing/2014/main" id="{F13A84B0-CA04-30A1-F3D1-DACC5EF0B640}"/>
+              </a:ext>
+            </a:extLst>
+          </p:cNvPr>
+          <p:cNvPicPr>
+            <a:picLocks noChangeAspect="1"/>
+          </p:cNvPicPr>
+          <p:nvPr/>
+        </p:nvPicPr>
+        <p:blipFill>
+          <a:blip r:embed="rId15"/>
+          <a:stretch>
+            <a:fillRect/>
+          </a:stretch>
+        </p:blipFill>
+        <p:spPr>
+          <a:xfrm rot="21376929">
+            <a:off x="16577609" y="11136869"/>
+            <a:ext cx="7024328" cy="1522726"/>
+          </a:xfrm>
+          <a:prstGeom prst="rect">
+            <a:avLst/>
+          </a:prstGeom>
+          <a:solidFill>
+            <a:srgbClr val="FFFFFF">
+              <a:shade val="85000"/>
+            </a:srgbClr>
+          </a:solidFill>
+          <a:ln w="88900" cap="sq">
+            <a:solidFill>
+              <a:srgbClr val="FFFFFF"/>
+            </a:solidFill>
+            <a:miter lim="800000"/>
+          </a:ln>
+          <a:effectLst>
+            <a:outerShdw blurRad="55000" dist="18000" dir="5400000" algn="tl" rotWithShape="0">
+              <a:srgbClr val="000000">
+                <a:alpha val="40000"/>
+              </a:srgbClr>
+            </a:outerShdw>
+          </a:effectLst>
+          <a:scene3d>
+            <a:camera prst="orthographicFront"/>
+            <a:lightRig rig="twoPt" dir="t">
+              <a:rot lat="0" lon="0" rev="7200000"/>
+            </a:lightRig>
+          </a:scene3d>
+          <a:sp3d>
+            <a:bevelT w="25400" h="19050"/>
+            <a:contourClr>
+              <a:srgbClr val="FFFFFF"/>
+            </a:contourClr>
+          </a:sp3d>
+        </p:spPr>
+      </p:pic>
+      <p:pic>
+        <p:nvPicPr>
+          <p:cNvPr id="94" name="Picture 93">
+            <a:extLst>
+              <a:ext uri="{FF2B5EF4-FFF2-40B4-BE49-F238E27FC236}">
+                <a16:creationId xmlns:a16="http://schemas.microsoft.com/office/drawing/2014/main" id="{F219599D-E36E-7C38-3415-61B70CAB298D}"/>
+              </a:ext>
+            </a:extLst>
+          </p:cNvPr>
+          <p:cNvPicPr>
+            <a:picLocks noChangeAspect="1"/>
+          </p:cNvPicPr>
+          <p:nvPr/>
+        </p:nvPicPr>
+        <p:blipFill>
+          <a:blip r:embed="rId16"/>
+          <a:stretch>
+            <a:fillRect/>
+          </a:stretch>
+        </p:blipFill>
+        <p:spPr>
+          <a:xfrm rot="772387">
+            <a:off x="16062494" y="6445402"/>
+            <a:ext cx="2772315" cy="1269899"/>
+          </a:xfrm>
+          <a:prstGeom prst="rect">
+            <a:avLst/>
+          </a:prstGeom>
+          <a:solidFill>
+            <a:srgbClr val="FFFFFF">
+              <a:shade val="85000"/>
+            </a:srgbClr>
+          </a:solidFill>
+          <a:ln w="88900" cap="sq">
+            <a:solidFill>
+              <a:srgbClr val="FFFFFF"/>
+            </a:solidFill>
+            <a:miter lim="800000"/>
+          </a:ln>
+          <a:effectLst>
+            <a:outerShdw blurRad="55000" dist="18000" dir="5400000" algn="tl" rotWithShape="0">
+              <a:srgbClr val="000000">
+                <a:alpha val="40000"/>
+              </a:srgbClr>
+            </a:outerShdw>
+          </a:effectLst>
+          <a:scene3d>
+            <a:camera prst="orthographicFront"/>
+            <a:lightRig rig="twoPt" dir="t">
+              <a:rot lat="0" lon="0" rev="7200000"/>
+            </a:lightRig>
+          </a:scene3d>
+          <a:sp3d>
+            <a:bevelT w="25400" h="19050"/>
+            <a:contourClr>
+              <a:srgbClr val="FFFFFF"/>
+            </a:contourClr>
+          </a:sp3d>
+        </p:spPr>
+      </p:pic>
+      <p:pic>
+        <p:nvPicPr>
+          <p:cNvPr id="96" name="Picture 95">
+            <a:extLst>
+              <a:ext uri="{FF2B5EF4-FFF2-40B4-BE49-F238E27FC236}">
+                <a16:creationId xmlns:a16="http://schemas.microsoft.com/office/drawing/2014/main" id="{2ECD435D-E62F-2CD1-A7A3-004995B77BB8}"/>
+              </a:ext>
+            </a:extLst>
+          </p:cNvPr>
+          <p:cNvPicPr>
+            <a:picLocks noChangeAspect="1"/>
+          </p:cNvPicPr>
+          <p:nvPr/>
+        </p:nvPicPr>
+        <p:blipFill>
+          <a:blip r:embed="rId17"/>
+          <a:stretch>
+            <a:fillRect/>
+          </a:stretch>
+        </p:blipFill>
+        <p:spPr>
+          <a:xfrm rot="390891">
+            <a:off x="16918416" y="9473426"/>
+            <a:ext cx="4501973" cy="1433572"/>
+          </a:xfrm>
+          <a:prstGeom prst="rect">
+            <a:avLst/>
+          </a:prstGeom>
+          <a:solidFill>
+            <a:srgbClr val="FFFFFF">
+              <a:shade val="85000"/>
+            </a:srgbClr>
+          </a:solidFill>
+          <a:ln w="88900" cap="sq">
+            <a:solidFill>
+              <a:srgbClr val="FFFFFF"/>
+            </a:solidFill>
+            <a:miter lim="800000"/>
+          </a:ln>
+          <a:effectLst>
+            <a:outerShdw blurRad="55000" dist="18000" dir="5400000" algn="tl" rotWithShape="0">
+              <a:srgbClr val="000000">
+                <a:alpha val="40000"/>
+              </a:srgbClr>
+            </a:outerShdw>
+          </a:effectLst>
+          <a:scene3d>
+            <a:camera prst="orthographicFront"/>
+            <a:lightRig rig="twoPt" dir="t">
+              <a:rot lat="0" lon="0" rev="7200000"/>
+            </a:lightRig>
+          </a:scene3d>
+          <a:sp3d>
+            <a:bevelT w="25400" h="19050"/>
+            <a:contourClr>
+              <a:srgbClr val="FFFFFF"/>
+            </a:contourClr>
+          </a:sp3d>
+        </p:spPr>
+      </p:pic>
+      <p:pic>
+        <p:nvPicPr>
+          <p:cNvPr id="106" name="Picture 105">
+            <a:extLst>
+              <a:ext uri="{FF2B5EF4-FFF2-40B4-BE49-F238E27FC236}">
+                <a16:creationId xmlns:a16="http://schemas.microsoft.com/office/drawing/2014/main" id="{B88880C1-056D-609F-5A17-BD93B8C4B16D}"/>
+              </a:ext>
+            </a:extLst>
+          </p:cNvPr>
+          <p:cNvPicPr>
+            <a:picLocks noChangeAspect="1"/>
+          </p:cNvPicPr>
+          <p:nvPr/>
+        </p:nvPicPr>
+        <p:blipFill>
+          <a:blip r:embed="rId18"/>
+          <a:stretch>
+            <a:fillRect/>
+          </a:stretch>
+        </p:blipFill>
+        <p:spPr>
+          <a:xfrm rot="446435">
+            <a:off x="21110517" y="6408692"/>
+            <a:ext cx="4055279" cy="1524267"/>
+          </a:xfrm>
+          <a:prstGeom prst="rect">
+            <a:avLst/>
+          </a:prstGeom>
+          <a:solidFill>
+            <a:srgbClr val="FFFFFF">
+              <a:shade val="85000"/>
+            </a:srgbClr>
+          </a:solidFill>
+          <a:ln w="88900" cap="sq">
+            <a:solidFill>
+              <a:srgbClr val="FFFFFF"/>
+            </a:solidFill>
+            <a:miter lim="800000"/>
+          </a:ln>
+          <a:effectLst>
+            <a:outerShdw blurRad="55000" dist="18000" dir="5400000" algn="tl" rotWithShape="0">
+              <a:srgbClr val="000000">
+                <a:alpha val="40000"/>
+              </a:srgbClr>
+            </a:outerShdw>
+          </a:effectLst>
+          <a:scene3d>
+            <a:camera prst="orthographicFront"/>
+            <a:lightRig rig="twoPt" dir="t">
+              <a:rot lat="0" lon="0" rev="7200000"/>
+            </a:lightRig>
+          </a:scene3d>
+          <a:sp3d>
+            <a:bevelT w="25400" h="19050"/>
+            <a:contourClr>
+              <a:srgbClr val="FFFFFF"/>
+            </a:contourClr>
+          </a:sp3d>
+        </p:spPr>
+      </p:pic>
+      <p:pic>
+        <p:nvPicPr>
+          <p:cNvPr id="101" name="Picture 100">
+            <a:extLst>
+              <a:ext uri="{FF2B5EF4-FFF2-40B4-BE49-F238E27FC236}">
+                <a16:creationId xmlns:a16="http://schemas.microsoft.com/office/drawing/2014/main" id="{EFFA7040-62CC-E4A7-0744-342C3E4436FE}"/>
+              </a:ext>
+            </a:extLst>
+          </p:cNvPr>
+          <p:cNvPicPr>
+            <a:picLocks noChangeAspect="1"/>
+          </p:cNvPicPr>
+          <p:nvPr/>
+        </p:nvPicPr>
+        <p:blipFill>
+          <a:blip r:embed="rId19"/>
+          <a:stretch>
+            <a:fillRect/>
+          </a:stretch>
+        </p:blipFill>
+        <p:spPr>
+          <a:xfrm rot="21359276">
+            <a:off x="23513285" y="7962579"/>
+            <a:ext cx="4655840" cy="1794790"/>
+          </a:xfrm>
+          <a:prstGeom prst="rect">
+            <a:avLst/>
+          </a:prstGeom>
+          <a:solidFill>
+            <a:srgbClr val="FFFFFF">
+              <a:shade val="85000"/>
+            </a:srgbClr>
+          </a:solidFill>
+          <a:ln w="88900" cap="sq">
+            <a:solidFill>
+              <a:srgbClr val="FFFFFF"/>
+            </a:solidFill>
+            <a:miter lim="800000"/>
+          </a:ln>
+          <a:effectLst>
+            <a:outerShdw blurRad="55000" dist="18000" dir="5400000" algn="tl" rotWithShape="0">
+              <a:srgbClr val="000000">
+                <a:alpha val="40000"/>
+              </a:srgbClr>
+            </a:outerShdw>
+          </a:effectLst>
+          <a:scene3d>
+            <a:camera prst="orthographicFront"/>
+            <a:lightRig rig="twoPt" dir="t">
+              <a:rot lat="0" lon="0" rev="7200000"/>
+            </a:lightRig>
+          </a:scene3d>
+          <a:sp3d>
+            <a:bevelT w="25400" h="19050"/>
+            <a:contourClr>
+              <a:srgbClr val="FFFFFF"/>
+            </a:contourClr>
+          </a:sp3d>
+        </p:spPr>
+      </p:pic>
+      <p:pic>
+        <p:nvPicPr>
+          <p:cNvPr id="77" name="Picture 76">
+            <a:extLst>
+              <a:ext uri="{FF2B5EF4-FFF2-40B4-BE49-F238E27FC236}">
+                <a16:creationId xmlns:a16="http://schemas.microsoft.com/office/drawing/2014/main" id="{8E8A1081-926B-A19C-78E7-9FB8F5F1CA4E}"/>
+              </a:ext>
+            </a:extLst>
+          </p:cNvPr>
+          <p:cNvPicPr>
+            <a:picLocks noChangeAspect="1"/>
+          </p:cNvPicPr>
+          <p:nvPr/>
+        </p:nvPicPr>
+        <p:blipFill>
+          <a:blip r:embed="rId20"/>
+          <a:stretch>
+            <a:fillRect/>
+          </a:stretch>
+        </p:blipFill>
+        <p:spPr>
+          <a:xfrm rot="21073448">
+            <a:off x="15823649" y="8126161"/>
+            <a:ext cx="3582758" cy="1140206"/>
+          </a:xfrm>
+          <a:prstGeom prst="rect">
+            <a:avLst/>
+          </a:prstGeom>
+          <a:solidFill>
+            <a:srgbClr val="FFFFFF">
+              <a:shade val="85000"/>
+            </a:srgbClr>
+          </a:solidFill>
+          <a:ln w="88900" cap="sq">
+            <a:solidFill>
+              <a:srgbClr val="FFFFFF"/>
+            </a:solidFill>
+            <a:miter lim="800000"/>
+          </a:ln>
+          <a:effectLst>
+            <a:outerShdw blurRad="55000" dist="18000" dir="5400000" algn="tl" rotWithShape="0">
+              <a:srgbClr val="000000">
+                <a:alpha val="40000"/>
+              </a:srgbClr>
+            </a:outerShdw>
+          </a:effectLst>
+          <a:scene3d>
+            <a:camera prst="orthographicFront"/>
+            <a:lightRig rig="twoPt" dir="t">
+              <a:rot lat="0" lon="0" rev="7200000"/>
+            </a:lightRig>
+          </a:scene3d>
+          <a:sp3d>
+            <a:bevelT w="25400" h="19050"/>
+            <a:contourClr>
+              <a:srgbClr val="FFFFFF"/>
+            </a:contourClr>
+          </a:sp3d>
+        </p:spPr>
+      </p:pic>
+      <p:pic>
+        <p:nvPicPr>
+          <p:cNvPr id="87" name="Picture 86">
+            <a:extLst>
+              <a:ext uri="{FF2B5EF4-FFF2-40B4-BE49-F238E27FC236}">
+                <a16:creationId xmlns:a16="http://schemas.microsoft.com/office/drawing/2014/main" id="{060E079F-5DD7-1D49-026E-B2AE2FFDB1F7}"/>
+              </a:ext>
+            </a:extLst>
+          </p:cNvPr>
+          <p:cNvPicPr>
+            <a:picLocks noChangeAspect="1"/>
+          </p:cNvPicPr>
+          <p:nvPr/>
+        </p:nvPicPr>
+        <p:blipFill>
+          <a:blip r:embed="rId21"/>
+          <a:stretch>
+            <a:fillRect/>
+          </a:stretch>
+        </p:blipFill>
+        <p:spPr>
+          <a:xfrm rot="20323681">
+            <a:off x="25891837" y="6095582"/>
+            <a:ext cx="2029523" cy="1661043"/>
+          </a:xfrm>
+          <a:prstGeom prst="rect">
+            <a:avLst/>
+          </a:prstGeom>
+          <a:solidFill>
+            <a:srgbClr val="FFFFFF">
+              <a:shade val="85000"/>
+            </a:srgbClr>
+          </a:solidFill>
+          <a:ln w="88900" cap="sq">
+            <a:solidFill>
+              <a:srgbClr val="FFFFFF"/>
+            </a:solidFill>
+            <a:miter lim="800000"/>
+          </a:ln>
+          <a:effectLst>
+            <a:outerShdw blurRad="55000" dist="18000" dir="5400000" algn="tl" rotWithShape="0">
+              <a:srgbClr val="000000">
+                <a:alpha val="40000"/>
+              </a:srgbClr>
+            </a:outerShdw>
+          </a:effectLst>
+          <a:scene3d>
+            <a:camera prst="orthographicFront"/>
+            <a:lightRig rig="twoPt" dir="t">
+              <a:rot lat="0" lon="0" rev="7200000"/>
+            </a:lightRig>
+          </a:scene3d>
+          <a:sp3d>
+            <a:bevelT w="25400" h="19050"/>
+            <a:contourClr>
+              <a:srgbClr val="FFFFFF"/>
+            </a:contourClr>
+          </a:sp3d>
+        </p:spPr>
+      </p:pic>
+      <p:sp>
+        <p:nvSpPr>
+          <p:cNvPr id="127" name="TextBox 126">
+            <a:extLst>
+              <a:ext uri="{FF2B5EF4-FFF2-40B4-BE49-F238E27FC236}">
+                <a16:creationId xmlns:a16="http://schemas.microsoft.com/office/drawing/2014/main" id="{1ABD063D-302A-284F-BF7E-5F4EB3CDAADD}"/>
+              </a:ext>
+            </a:extLst>
+          </p:cNvPr>
+          <p:cNvSpPr txBox="1"/>
+          <p:nvPr/>
+        </p:nvSpPr>
+        <p:spPr>
+          <a:xfrm rot="2160186">
+            <a:off x="18478404" y="9216859"/>
+            <a:ext cx="8245470" cy="1015663"/>
+          </a:xfrm>
+          <a:prstGeom prst="rect">
+            <a:avLst/>
+          </a:prstGeom>
+          <a:noFill/>
+          <a:ln w="63500" cap="flat">
+            <a:solidFill>
+              <a:srgbClr val="C00000">
+                <a:alpha val="35000"/>
+              </a:srgbClr>
+            </a:solidFill>
+            <a:round/>
+          </a:ln>
+        </p:spPr>
+        <p:txBody>
+          <a:bodyPr wrap="square" rtlCol="0">
+            <a:spAutoFit/>
+          </a:bodyPr>
+          <a:lstStyle/>
+          <a:p>
+            <a:pPr algn="ctr"/>
+            <a:r>
+              <a:rPr lang="en-US" sz="6000" b="1" dirty="0">
+                <a:solidFill>
+                  <a:srgbClr val="C00000">
+                    <a:alpha val="50000"/>
+                  </a:srgbClr>
+                </a:solidFill>
+              </a:rPr>
+              <a:t>PHYSICS</a:t>
+            </a:r>
+            <a:r>
+              <a:rPr lang="en-US" sz="6000" b="1" dirty="0">
+                <a:solidFill>
+                  <a:srgbClr val="EA0000">
+                    <a:alpha val="50000"/>
+                  </a:srgbClr>
+                </a:solidFill>
+              </a:rPr>
+              <a:t> </a:t>
+            </a:r>
+            <a:r>
+              <a:rPr lang="en-US" sz="6000" b="1" dirty="0">
+                <a:solidFill>
+                  <a:srgbClr val="C00000">
+                    <a:alpha val="50000"/>
+                  </a:srgbClr>
+                </a:solidFill>
+              </a:rPr>
+              <a:t>FORMULAS</a:t>
+            </a:r>
+          </a:p>
+        </p:txBody>
+      </p:sp>
     </p:spTree>
   </p:cSld>
   <p:clrMapOvr>

</xml_diff>

<commit_message>
finished challenges sectoins and fixed moment picture
</commit_message>
<xml_diff>
--- a/poster.pptx
+++ b/poster.pptx
@@ -197,7 +197,7 @@
           <a:p>
             <a:fld id="{0DEDE336-5B65-4C33-851F-FD6343DCB477}" type="datetimeFigureOut">
               <a:rPr lang="en-US" smtClean="0"/>
-              <a:t>6/22/2023</a:t>
+              <a:t>6/23/2023</a:t>
             </a:fld>
             <a:endParaRPr lang="en-US"/>
           </a:p>
@@ -3106,6 +3106,36 @@
           <a:chExt cx="0" cy="0"/>
         </a:xfrm>
       </p:grpSpPr>
+      <p:pic>
+        <p:nvPicPr>
+          <p:cNvPr id="23" name="Picture 22">
+            <a:extLst>
+              <a:ext uri="{FF2B5EF4-FFF2-40B4-BE49-F238E27FC236}">
+                <a16:creationId xmlns:a16="http://schemas.microsoft.com/office/drawing/2014/main" id="{AF2DF713-D7B6-B49E-1881-C28254AAD05C}"/>
+              </a:ext>
+            </a:extLst>
+          </p:cNvPr>
+          <p:cNvPicPr>
+            <a:picLocks noChangeAspect="1"/>
+          </p:cNvPicPr>
+          <p:nvPr/>
+        </p:nvPicPr>
+        <p:blipFill>
+          <a:blip r:embed="rId3"/>
+          <a:stretch>
+            <a:fillRect/>
+          </a:stretch>
+        </p:blipFill>
+        <p:spPr>
+          <a:xfrm>
+            <a:off x="8093002" y="18814477"/>
+            <a:ext cx="6373981" cy="3848977"/>
+          </a:xfrm>
+          <a:prstGeom prst="rect">
+            <a:avLst/>
+          </a:prstGeom>
+        </p:spPr>
+      </p:pic>
       <p:sp>
         <p:nvSpPr>
           <p:cNvPr id="100" name="Oval 99">
@@ -3546,7 +3576,7 @@
             <a:pPr algn="just"/>
             <a:r>
               <a:rPr lang="en-US" sz="2800" dirty="0"/>
-              <a:t>The goal of the project is the extension of a pre-existing 2D physics engine implemented by Prof. Carzaniga. That engine, called “flying-balls”, only simulated interactions between circles. They bounced off of each other and off the walls represented by the edges of the window they were evolving in. The extension decided was to add the possibility to make arbitrary polygons collide with each other in a similarly to the balls in the initial project.</a:t>
+              <a:t>The goal of the project is the extension of a pre-existing 2D physics engine implemented by Prof. Carzaniga. That engine, called “flying-balls”, only simulated interactions between circles. They bounced off of each other and off the walls represented by the edges of the window they were evolving in. The extension decided was to add the possibility to make arbitrary polygons collide with each other similarly to the balls in the initial project.</a:t>
             </a:r>
           </a:p>
         </p:txBody>
@@ -3914,7 +3944,7 @@
           <p:nvPr/>
         </p:nvPicPr>
         <p:blipFill>
-          <a:blip r:embed="rId3" cstate="print">
+          <a:blip r:embed="rId4" cstate="print">
             <a:extLst>
               <a:ext uri="{28A0092B-C50C-407E-A947-70E740481C1C}">
                 <a14:useLocalDpi xmlns:a14="http://schemas.microsoft.com/office/drawing/2010/main" val="0"/>
@@ -3950,7 +3980,7 @@
           <p:nvPr/>
         </p:nvPicPr>
         <p:blipFill>
-          <a:blip r:embed="rId4">
+          <a:blip r:embed="rId5">
             <a:extLst>
               <a:ext uri="{28A0092B-C50C-407E-A947-70E740481C1C}">
                 <a14:useLocalDpi xmlns:a14="http://schemas.microsoft.com/office/drawing/2010/main" val="0"/>
@@ -3980,42 +4010,6 @@
               </a14:hiddenFill>
             </a:ext>
           </a:extLst>
-        </p:spPr>
-      </p:pic>
-      <p:pic>
-        <p:nvPicPr>
-          <p:cNvPr id="58" name="Picture 57" descr="A hexagon with a blue arrow pointing at the center&#10;&#10;Description automatically generated with low confidence">
-            <a:extLst>
-              <a:ext uri="{FF2B5EF4-FFF2-40B4-BE49-F238E27FC236}">
-                <a16:creationId xmlns:a16="http://schemas.microsoft.com/office/drawing/2014/main" id="{8579295C-203D-80F0-E511-F4FEAA344299}"/>
-              </a:ext>
-            </a:extLst>
-          </p:cNvPr>
-          <p:cNvPicPr>
-            <a:picLocks noChangeAspect="1"/>
-          </p:cNvPicPr>
-          <p:nvPr/>
-        </p:nvPicPr>
-        <p:blipFill>
-          <a:blip r:embed="rId5">
-            <a:extLst>
-              <a:ext uri="{28A0092B-C50C-407E-A947-70E740481C1C}">
-                <a14:useLocalDpi xmlns:a14="http://schemas.microsoft.com/office/drawing/2010/main" val="0"/>
-              </a:ext>
-            </a:extLst>
-          </a:blip>
-          <a:stretch>
-            <a:fillRect/>
-          </a:stretch>
-        </p:blipFill>
-        <p:spPr>
-          <a:xfrm>
-            <a:off x="7960228" y="18974577"/>
-            <a:ext cx="7118535" cy="5261525"/>
-          </a:xfrm>
-          <a:prstGeom prst="rect">
-            <a:avLst/>
-          </a:prstGeom>
         </p:spPr>
       </p:pic>
       <p:sp>
@@ -4245,8 +4239,8 @@
         </p:nvSpPr>
         <p:spPr>
           <a:xfrm>
-            <a:off x="15620640" y="35879620"/>
-            <a:ext cx="13100400" cy="3108543"/>
+            <a:off x="15620640" y="35651020"/>
+            <a:ext cx="13100400" cy="6316153"/>
           </a:xfrm>
           <a:prstGeom prst="rect">
             <a:avLst/>
@@ -4266,377 +4260,71 @@
             </a:lvl1pPr>
           </a:lstStyle>
           <a:p>
+            <a:pPr marL="457200" indent="-457200">
+              <a:lnSpc>
+                <a:spcPct val="150000"/>
+              </a:lnSpc>
+              <a:buFont typeface="Arial" panose="020B0604020202020204" pitchFamily="34" charset="0"/>
+              <a:buChar char="•"/>
+            </a:pPr>
             <a:r>
-              <a:rPr lang="en-US" dirty="0"/>
-              <a:t>Lorem ipsum dolor sit </a:t>
+              <a:rPr lang="en-US" sz="4000" dirty="0"/>
+              <a:t>Understanding what the moment of inertia meant</a:t>
             </a:r>
+          </a:p>
+          <a:p>
+            <a:pPr marL="457200" indent="-457200">
+              <a:lnSpc>
+                <a:spcPct val="150000"/>
+              </a:lnSpc>
+              <a:buFont typeface="Arial" panose="020B0604020202020204" pitchFamily="34" charset="0"/>
+              <a:buChar char="•"/>
+            </a:pPr>
             <a:r>
-              <a:rPr lang="en-US" dirty="0" err="1"/>
-              <a:t>amet</a:t>
+              <a:rPr lang="en-US" sz="4000" dirty="0"/>
+              <a:t>Calculating the moment of inertia of arbitrary polygon</a:t>
             </a:r>
+          </a:p>
+          <a:p>
+            <a:pPr marL="457200" indent="-457200">
+              <a:lnSpc>
+                <a:spcPct val="150000"/>
+              </a:lnSpc>
+              <a:spcAft>
+                <a:spcPts val="600"/>
+              </a:spcAft>
+              <a:buFont typeface="Arial" panose="020B0604020202020204" pitchFamily="34" charset="0"/>
+              <a:buChar char="•"/>
+            </a:pPr>
             <a:r>
-              <a:rPr lang="en-US" dirty="0"/>
-              <a:t>, </a:t>
+              <a:rPr lang="en-US" sz="4000" dirty="0"/>
+              <a:t>Handling a collision that spanned over multiple frames:</a:t>
             </a:r>
+          </a:p>
+          <a:p>
+            <a:pPr marL="914400" lvl="1" indent="-457200">
+              <a:lnSpc>
+                <a:spcPct val="150000"/>
+              </a:lnSpc>
+              <a:buFont typeface="Arial" panose="020B0604020202020204" pitchFamily="34" charset="0"/>
+              <a:buChar char="•"/>
+            </a:pPr>
             <a:r>
-              <a:rPr lang="en-US" dirty="0" err="1"/>
-              <a:t>consectetur</a:t>
+              <a:rPr lang="en-US" sz="3000" dirty="0"/>
+              <a:t>Frame 1: collision detected between A and B, apply resolution</a:t>
             </a:r>
+          </a:p>
+          <a:p>
+            <a:pPr marL="914400" lvl="1" indent="-457200">
+              <a:lnSpc>
+                <a:spcPct val="150000"/>
+              </a:lnSpc>
+              <a:buFont typeface="Arial" panose="020B0604020202020204" pitchFamily="34" charset="0"/>
+              <a:buChar char="•"/>
+            </a:pPr>
             <a:r>
-              <a:rPr lang="en-US" dirty="0"/>
-              <a:t> </a:t>
-            </a:r>
-            <a:r>
-              <a:rPr lang="en-US" dirty="0" err="1"/>
-              <a:t>adipiscing</a:t>
-            </a:r>
-            <a:r>
-              <a:rPr lang="en-US" dirty="0"/>
-              <a:t> </a:t>
-            </a:r>
-            <a:r>
-              <a:rPr lang="en-US" dirty="0" err="1"/>
-              <a:t>elit</a:t>
-            </a:r>
-            <a:r>
-              <a:rPr lang="en-US" dirty="0"/>
-              <a:t>. Donec </a:t>
-            </a:r>
-            <a:r>
-              <a:rPr lang="en-US" dirty="0" err="1"/>
-              <a:t>imperdiet</a:t>
-            </a:r>
-            <a:r>
-              <a:rPr lang="en-US" dirty="0"/>
-              <a:t> ligula vel </a:t>
-            </a:r>
-            <a:r>
-              <a:rPr lang="en-US" dirty="0" err="1"/>
-              <a:t>purus</a:t>
-            </a:r>
-            <a:r>
-              <a:rPr lang="en-US" dirty="0"/>
-              <a:t> </a:t>
-            </a:r>
-            <a:r>
-              <a:rPr lang="en-US" dirty="0" err="1"/>
-              <a:t>hendrerit</a:t>
-            </a:r>
-            <a:r>
-              <a:rPr lang="en-US" dirty="0"/>
-              <a:t>, id </a:t>
-            </a:r>
-            <a:r>
-              <a:rPr lang="en-US" dirty="0" err="1"/>
-              <a:t>ullamcorper</a:t>
-            </a:r>
-            <a:r>
-              <a:rPr lang="en-US" dirty="0"/>
-              <a:t> ante </a:t>
-            </a:r>
-            <a:r>
-              <a:rPr lang="en-US" dirty="0" err="1"/>
-              <a:t>malesuada</a:t>
-            </a:r>
-            <a:r>
-              <a:rPr lang="en-US" dirty="0"/>
-              <a:t>. Donec maximus </a:t>
-            </a:r>
-            <a:r>
-              <a:rPr lang="en-US" dirty="0" err="1"/>
-              <a:t>mattis</a:t>
-            </a:r>
-            <a:r>
-              <a:rPr lang="en-US" dirty="0"/>
-              <a:t> </a:t>
-            </a:r>
-            <a:r>
-              <a:rPr lang="en-US" dirty="0" err="1"/>
-              <a:t>erat</a:t>
-            </a:r>
-            <a:r>
-              <a:rPr lang="en-US" dirty="0"/>
-              <a:t> at </a:t>
-            </a:r>
-            <a:r>
-              <a:rPr lang="en-US" dirty="0" err="1"/>
-              <a:t>consequat</a:t>
-            </a:r>
-            <a:r>
-              <a:rPr lang="en-US" dirty="0"/>
-              <a:t>. Nam </a:t>
-            </a:r>
-            <a:r>
-              <a:rPr lang="en-US" dirty="0" err="1"/>
-              <a:t>fringilla</a:t>
-            </a:r>
-            <a:r>
-              <a:rPr lang="en-US" dirty="0"/>
-              <a:t> </a:t>
-            </a:r>
-            <a:r>
-              <a:rPr lang="en-US" dirty="0" err="1"/>
-              <a:t>velit</a:t>
-            </a:r>
-            <a:r>
-              <a:rPr lang="en-US" dirty="0"/>
-              <a:t> </a:t>
-            </a:r>
-            <a:r>
-              <a:rPr lang="en-US" dirty="0" err="1"/>
-              <a:t>consequat</a:t>
-            </a:r>
-            <a:r>
-              <a:rPr lang="en-US" dirty="0"/>
-              <a:t>, </a:t>
-            </a:r>
-            <a:r>
-              <a:rPr lang="en-US" dirty="0" err="1"/>
-              <a:t>bibendum</a:t>
-            </a:r>
-            <a:r>
-              <a:rPr lang="en-US" dirty="0"/>
-              <a:t> ipsum vel, </a:t>
-            </a:r>
-            <a:r>
-              <a:rPr lang="en-US" dirty="0" err="1"/>
-              <a:t>vehicula</a:t>
-            </a:r>
-            <a:r>
-              <a:rPr lang="en-US" dirty="0"/>
-              <a:t> </a:t>
-            </a:r>
-            <a:r>
-              <a:rPr lang="en-US" dirty="0" err="1"/>
-              <a:t>turpis</a:t>
-            </a:r>
-            <a:r>
-              <a:rPr lang="en-US" dirty="0"/>
-              <a:t>. </a:t>
-            </a:r>
-            <a:r>
-              <a:rPr lang="en-US" dirty="0" err="1"/>
-              <a:t>Pellentesque</a:t>
-            </a:r>
-            <a:r>
-              <a:rPr lang="en-US" dirty="0"/>
-              <a:t> a diam </a:t>
-            </a:r>
-            <a:r>
-              <a:rPr lang="en-US" dirty="0" err="1"/>
-              <a:t>scelerisque</a:t>
-            </a:r>
-            <a:r>
-              <a:rPr lang="en-US" dirty="0"/>
-              <a:t>, </a:t>
-            </a:r>
-            <a:r>
-              <a:rPr lang="en-US" dirty="0" err="1"/>
-              <a:t>euismod</a:t>
-            </a:r>
-            <a:r>
-              <a:rPr lang="en-US" dirty="0"/>
-              <a:t> </a:t>
-            </a:r>
-            <a:r>
-              <a:rPr lang="en-US" dirty="0" err="1"/>
-              <a:t>lectus</a:t>
-            </a:r>
-            <a:r>
-              <a:rPr lang="en-US" dirty="0"/>
-              <a:t> </a:t>
-            </a:r>
-            <a:r>
-              <a:rPr lang="en-US" dirty="0" err="1"/>
-              <a:t>eu</a:t>
-            </a:r>
-            <a:r>
-              <a:rPr lang="en-US" dirty="0"/>
-              <a:t>, gravida </a:t>
-            </a:r>
-            <a:r>
-              <a:rPr lang="en-US" dirty="0" err="1"/>
-              <a:t>nibh</a:t>
-            </a:r>
-            <a:r>
-              <a:rPr lang="en-US" dirty="0"/>
-              <a:t>. Duis </a:t>
-            </a:r>
-            <a:r>
-              <a:rPr lang="en-US" dirty="0" err="1"/>
-              <a:t>varius</a:t>
-            </a:r>
-            <a:r>
-              <a:rPr lang="en-US" dirty="0"/>
-              <a:t> </a:t>
-            </a:r>
-            <a:r>
-              <a:rPr lang="en-US" dirty="0" err="1"/>
-              <a:t>ut</a:t>
-            </a:r>
-            <a:r>
-              <a:rPr lang="en-US" dirty="0"/>
-              <a:t> </a:t>
-            </a:r>
-            <a:r>
-              <a:rPr lang="en-US" dirty="0" err="1"/>
-              <a:t>nibh</a:t>
-            </a:r>
-            <a:r>
-              <a:rPr lang="en-US" dirty="0"/>
-              <a:t> in </a:t>
-            </a:r>
-            <a:r>
-              <a:rPr lang="en-US" dirty="0" err="1"/>
-              <a:t>congue</a:t>
-            </a:r>
-            <a:r>
-              <a:rPr lang="en-US" dirty="0"/>
-              <a:t>. </a:t>
-            </a:r>
-            <a:r>
-              <a:rPr lang="en-US" dirty="0" err="1"/>
-              <a:t>Vivamus</a:t>
-            </a:r>
-            <a:r>
-              <a:rPr lang="en-US" dirty="0"/>
-              <a:t> </a:t>
-            </a:r>
-            <a:r>
-              <a:rPr lang="en-US" dirty="0" err="1"/>
-              <a:t>placerat</a:t>
-            </a:r>
-            <a:r>
-              <a:rPr lang="en-US" dirty="0"/>
-              <a:t> </a:t>
-            </a:r>
-            <a:r>
-              <a:rPr lang="en-US" dirty="0" err="1"/>
-              <a:t>blandit</a:t>
-            </a:r>
-            <a:r>
-              <a:rPr lang="en-US" dirty="0"/>
-              <a:t> </a:t>
-            </a:r>
-            <a:r>
-              <a:rPr lang="en-US" dirty="0" err="1"/>
-              <a:t>blandit</a:t>
-            </a:r>
-            <a:r>
-              <a:rPr lang="en-US" dirty="0"/>
-              <a:t>. Morbi </a:t>
-            </a:r>
-            <a:r>
-              <a:rPr lang="en-US" dirty="0" err="1"/>
-              <a:t>ornare</a:t>
-            </a:r>
-            <a:r>
-              <a:rPr lang="en-US" dirty="0"/>
-              <a:t>, </a:t>
-            </a:r>
-            <a:r>
-              <a:rPr lang="en-US" dirty="0" err="1"/>
-              <a:t>arcu</a:t>
-            </a:r>
-            <a:r>
-              <a:rPr lang="en-US" dirty="0"/>
-              <a:t> non </a:t>
-            </a:r>
-            <a:r>
-              <a:rPr lang="en-US" dirty="0" err="1"/>
-              <a:t>hendrerit</a:t>
-            </a:r>
-            <a:r>
-              <a:rPr lang="en-US" dirty="0"/>
-              <a:t> </a:t>
-            </a:r>
-            <a:r>
-              <a:rPr lang="en-US" dirty="0" err="1"/>
-              <a:t>accumsan</a:t>
-            </a:r>
-            <a:r>
-              <a:rPr lang="en-US" dirty="0"/>
-              <a:t>, </a:t>
-            </a:r>
-            <a:r>
-              <a:rPr lang="en-US" dirty="0" err="1"/>
-              <a:t>lacus</a:t>
-            </a:r>
-            <a:r>
-              <a:rPr lang="en-US" dirty="0"/>
-              <a:t> </a:t>
-            </a:r>
-            <a:r>
-              <a:rPr lang="en-US" dirty="0" err="1"/>
-              <a:t>lacus</a:t>
-            </a:r>
-            <a:r>
-              <a:rPr lang="en-US" dirty="0"/>
-              <a:t> </a:t>
-            </a:r>
-            <a:r>
-              <a:rPr lang="en-US" dirty="0" err="1"/>
-              <a:t>tincidunt</a:t>
-            </a:r>
-            <a:r>
-              <a:rPr lang="en-US" dirty="0"/>
-              <a:t> lorem, vel </a:t>
-            </a:r>
-            <a:r>
-              <a:rPr lang="en-US" dirty="0" err="1"/>
-              <a:t>tincidunt</a:t>
-            </a:r>
-            <a:r>
-              <a:rPr lang="en-US" dirty="0"/>
-              <a:t> </a:t>
-            </a:r>
-            <a:r>
-              <a:rPr lang="en-US" dirty="0" err="1"/>
-              <a:t>orci</a:t>
-            </a:r>
-            <a:r>
-              <a:rPr lang="en-US" dirty="0"/>
-              <a:t> </a:t>
-            </a:r>
-            <a:r>
-              <a:rPr lang="en-US" dirty="0" err="1"/>
-              <a:t>lectus</a:t>
-            </a:r>
-            <a:r>
-              <a:rPr lang="en-US" dirty="0"/>
-              <a:t> </a:t>
-            </a:r>
-            <a:r>
-              <a:rPr lang="en-US" dirty="0" err="1"/>
-              <a:t>ut</a:t>
-            </a:r>
-            <a:r>
-              <a:rPr lang="en-US" dirty="0"/>
-              <a:t> dui. Nam sit </a:t>
-            </a:r>
-            <a:r>
-              <a:rPr lang="en-US" dirty="0" err="1"/>
-              <a:t>amet</a:t>
-            </a:r>
-            <a:r>
-              <a:rPr lang="en-US" dirty="0"/>
-              <a:t> </a:t>
-            </a:r>
-            <a:r>
-              <a:rPr lang="en-US" dirty="0" err="1"/>
-              <a:t>accumsan</a:t>
-            </a:r>
-            <a:r>
-              <a:rPr lang="en-US" dirty="0"/>
-              <a:t> libero, a vestibulum </a:t>
-            </a:r>
-            <a:r>
-              <a:rPr lang="en-US" dirty="0" err="1"/>
-              <a:t>purus</a:t>
-            </a:r>
-            <a:r>
-              <a:rPr lang="en-US" dirty="0"/>
-              <a:t>. </a:t>
+              <a:rPr lang="en-US" sz="3000" dirty="0"/>
+              <a:t>Frame 2: collision detected again between A and B, but no resolution 		       must occur, because it already was applied on previous 		       frame, so we need to “ignore” the collision. Finding the 			       “ignoring” criteria was quite difficult.</a:t>
             </a:r>
           </a:p>
         </p:txBody>
@@ -8563,6 +8251,68 @@
           </a:p>
         </p:txBody>
       </p:sp>
+      <p:pic>
+        <p:nvPicPr>
+          <p:cNvPr id="6" name="Picture 2" descr="Deep rotating arrow, arrow, rotation, laps, JPG, PNG and AI">
+            <a:extLst>
+              <a:ext uri="{FF2B5EF4-FFF2-40B4-BE49-F238E27FC236}">
+                <a16:creationId xmlns:a16="http://schemas.microsoft.com/office/drawing/2014/main" id="{4BE009C4-D071-5A8F-F83D-7B2D245B279E}"/>
+              </a:ext>
+            </a:extLst>
+          </p:cNvPr>
+          <p:cNvPicPr>
+            <a:picLocks noChangeAspect="1" noChangeArrowheads="1"/>
+          </p:cNvPicPr>
+          <p:nvPr/>
+        </p:nvPicPr>
+        <p:blipFill>
+          <a:blip r:embed="rId22" cstate="print">
+            <a:extLst>
+              <a:ext uri="{BEBA8EAE-BF5A-486C-A8C5-ECC9F3942E4B}">
+                <a14:imgProps xmlns:a14="http://schemas.microsoft.com/office/drawing/2010/main">
+                  <a14:imgLayer r:embed="rId23">
+                    <a14:imgEffect>
+                      <a14:backgroundRemoval t="10000" b="90000" l="8283" r="92929">
+                        <a14:foregroundMark x1="32323" y1="25882" x2="32323" y2="25882"/>
+                        <a14:foregroundMark x1="8283" y1="57353" x2="8283" y2="57353"/>
+                        <a14:foregroundMark x1="58384" y1="22353" x2="58384" y2="22353"/>
+                        <a14:foregroundMark x1="77778" y1="70294" x2="77778" y2="70294"/>
+                        <a14:foregroundMark x1="92929" y1="45882" x2="92929" y2="45882"/>
+                      </a14:backgroundRemoval>
+                    </a14:imgEffect>
+                  </a14:imgLayer>
+                </a14:imgProps>
+              </a:ext>
+              <a:ext uri="{28A0092B-C50C-407E-A947-70E740481C1C}">
+                <a14:useLocalDpi xmlns:a14="http://schemas.microsoft.com/office/drawing/2010/main" val="0"/>
+              </a:ext>
+            </a:extLst>
+          </a:blip>
+          <a:srcRect/>
+          <a:stretch>
+            <a:fillRect/>
+          </a:stretch>
+        </p:blipFill>
+        <p:spPr bwMode="auto">
+          <a:xfrm>
+            <a:off x="10992196" y="19323965"/>
+            <a:ext cx="769160" cy="528312"/>
+          </a:xfrm>
+          <a:prstGeom prst="rect">
+            <a:avLst/>
+          </a:prstGeom>
+          <a:noFill/>
+          <a:extLst>
+            <a:ext uri="{909E8E84-426E-40DD-AFC4-6F175D3DCCD1}">
+              <a14:hiddenFill xmlns:a14="http://schemas.microsoft.com/office/drawing/2010/main">
+                <a:solidFill>
+                  <a:srgbClr val="FFFFFF"/>
+                </a:solidFill>
+              </a14:hiddenFill>
+            </a:ext>
+          </a:extLst>
+        </p:spPr>
+      </p:pic>
     </p:spTree>
   </p:cSld>
   <p:clrMapOvr>

</xml_diff>